<commit_message>
fix something but idk what is that
</commit_message>
<xml_diff>
--- a/Presentaion.pptx
+++ b/Presentaion.pptx
@@ -630,7 +630,10 @@
           <a:bodyPr/>
           <a:lstStyle/>
           <a:p>
-            <a:endParaRPr lang="en-US" dirty="0"/>
+            <a:r>
+              <a:rPr lang="en-US" dirty="0"/>
+              <a:t>Where did this idea came from?</a:t>
+            </a:r>
           </a:p>
         </p:txBody>
       </p:sp>
@@ -2698,7 +2701,7 @@
         </p:nvSpPr>
         <p:spPr>
           <a:xfrm>
-            <a:off x="4486502" y="525896"/>
+            <a:off x="4155218" y="525896"/>
             <a:ext cx="6164826" cy="1225762"/>
           </a:xfrm>
         </p:spPr>

</xml_diff>